<commit_message>
edited presentation and added final report
</commit_message>
<xml_diff>
--- a/MLproject/MLpresentation.pptx
+++ b/MLproject/MLpresentation.pptx
@@ -4,6 +4,9 @@
   <p:sldMasterIdLst>
     <p:sldMasterId id="2147483648" r:id="rId1"/>
   </p:sldMasterIdLst>
+  <p:notesMasterIdLst>
+    <p:notesMasterId r:id="rId11"/>
+  </p:notesMasterIdLst>
   <p:sldIdLst>
     <p:sldId id="256" r:id="rId2"/>
     <p:sldId id="257" r:id="rId3"/>
@@ -11,8 +14,9 @@
     <p:sldId id="259" r:id="rId5"/>
     <p:sldId id="260" r:id="rId6"/>
     <p:sldId id="261" r:id="rId7"/>
-    <p:sldId id="262" r:id="rId8"/>
-    <p:sldId id="263" r:id="rId9"/>
+    <p:sldId id="264" r:id="rId8"/>
+    <p:sldId id="262" r:id="rId9"/>
+    <p:sldId id="263" r:id="rId10"/>
   </p:sldIdLst>
   <p:sldSz cx="12192000" cy="6858000"/>
   <p:notesSz cx="6858000" cy="9144000"/>
@@ -119,6 +123,440 @@
 </p:presentation>
 </file>
 
+<file path=ppt/notesMasters/notesMaster1.xml><?xml version="1.0" encoding="utf-8"?>
+<p:notesMaster xmlns:a="http://schemas.openxmlformats.org/drawingml/2006/main" xmlns:r="http://schemas.openxmlformats.org/officeDocument/2006/relationships" xmlns:p="http://schemas.openxmlformats.org/presentationml/2006/main">
+  <p:cSld>
+    <p:bg>
+      <p:bgRef idx="1001">
+        <a:schemeClr val="bg1"/>
+      </p:bgRef>
+    </p:bg>
+    <p:spTree>
+      <p:nvGrpSpPr>
+        <p:cNvPr id="1" name=""/>
+        <p:cNvGrpSpPr/>
+        <p:nvPr/>
+      </p:nvGrpSpPr>
+      <p:grpSpPr>
+        <a:xfrm>
+          <a:off x="0" y="0"/>
+          <a:ext cx="0" cy="0"/>
+          <a:chOff x="0" y="0"/>
+          <a:chExt cx="0" cy="0"/>
+        </a:xfrm>
+      </p:grpSpPr>
+      <p:sp>
+        <p:nvSpPr>
+          <p:cNvPr id="2" name="Header Placeholder 1"/>
+          <p:cNvSpPr>
+            <a:spLocks noGrp="1"/>
+          </p:cNvSpPr>
+          <p:nvPr>
+            <p:ph type="hdr" sz="quarter"/>
+          </p:nvPr>
+        </p:nvSpPr>
+        <p:spPr>
+          <a:xfrm>
+            <a:off x="0" y="0"/>
+            <a:ext cx="2971800" cy="458788"/>
+          </a:xfrm>
+          <a:prstGeom prst="rect">
+            <a:avLst/>
+          </a:prstGeom>
+        </p:spPr>
+        <p:txBody>
+          <a:bodyPr vert="horz" lIns="91440" tIns="45720" rIns="91440" bIns="45720" rtlCol="0"/>
+          <a:lstStyle>
+            <a:lvl1pPr algn="l">
+              <a:defRPr sz="1200"/>
+            </a:lvl1pPr>
+          </a:lstStyle>
+          <a:p>
+            <a:endParaRPr lang="en-US"/>
+          </a:p>
+        </p:txBody>
+      </p:sp>
+      <p:sp>
+        <p:nvSpPr>
+          <p:cNvPr id="3" name="Date Placeholder 2"/>
+          <p:cNvSpPr>
+            <a:spLocks noGrp="1"/>
+          </p:cNvSpPr>
+          <p:nvPr>
+            <p:ph type="dt" idx="1"/>
+          </p:nvPr>
+        </p:nvSpPr>
+        <p:spPr>
+          <a:xfrm>
+            <a:off x="3884613" y="0"/>
+            <a:ext cx="2971800" cy="458788"/>
+          </a:xfrm>
+          <a:prstGeom prst="rect">
+            <a:avLst/>
+          </a:prstGeom>
+        </p:spPr>
+        <p:txBody>
+          <a:bodyPr vert="horz" lIns="91440" tIns="45720" rIns="91440" bIns="45720" rtlCol="0"/>
+          <a:lstStyle>
+            <a:lvl1pPr algn="r">
+              <a:defRPr sz="1200"/>
+            </a:lvl1pPr>
+          </a:lstStyle>
+          <a:p>
+            <a:fld id="{6C5A7BC0-7B0E-D14E-ACAE-45114CCBA70D}" type="datetimeFigureOut">
+              <a:rPr lang="en-US" smtClean="0"/>
+              <a:t>4/23/16</a:t>
+            </a:fld>
+            <a:endParaRPr lang="en-US"/>
+          </a:p>
+        </p:txBody>
+      </p:sp>
+      <p:sp>
+        <p:nvSpPr>
+          <p:cNvPr id="4" name="Slide Image Placeholder 3"/>
+          <p:cNvSpPr>
+            <a:spLocks noGrp="1" noRot="1" noChangeAspect="1"/>
+          </p:cNvSpPr>
+          <p:nvPr>
+            <p:ph type="sldImg" idx="2"/>
+          </p:nvPr>
+        </p:nvSpPr>
+        <p:spPr>
+          <a:xfrm>
+            <a:off x="685800" y="1143000"/>
+            <a:ext cx="5486400" cy="3086100"/>
+          </a:xfrm>
+          <a:prstGeom prst="rect">
+            <a:avLst/>
+          </a:prstGeom>
+          <a:noFill/>
+          <a:ln w="12700">
+            <a:solidFill>
+              <a:prstClr val="black"/>
+            </a:solidFill>
+          </a:ln>
+        </p:spPr>
+        <p:txBody>
+          <a:bodyPr vert="horz" lIns="91440" tIns="45720" rIns="91440" bIns="45720" rtlCol="0" anchor="ctr"/>
+          <a:lstStyle/>
+          <a:p>
+            <a:endParaRPr lang="en-US"/>
+          </a:p>
+        </p:txBody>
+      </p:sp>
+      <p:sp>
+        <p:nvSpPr>
+          <p:cNvPr id="5" name="Notes Placeholder 4"/>
+          <p:cNvSpPr>
+            <a:spLocks noGrp="1"/>
+          </p:cNvSpPr>
+          <p:nvPr>
+            <p:ph type="body" sz="quarter" idx="3"/>
+          </p:nvPr>
+        </p:nvSpPr>
+        <p:spPr>
+          <a:xfrm>
+            <a:off x="685800" y="4400550"/>
+            <a:ext cx="5486400" cy="3600450"/>
+          </a:xfrm>
+          <a:prstGeom prst="rect">
+            <a:avLst/>
+          </a:prstGeom>
+        </p:spPr>
+        <p:txBody>
+          <a:bodyPr vert="horz" lIns="91440" tIns="45720" rIns="91440" bIns="45720" rtlCol="0"/>
+          <a:lstStyle/>
+          <a:p>
+            <a:pPr lvl="0"/>
+            <a:r>
+              <a:rPr lang="en-US" smtClean="0"/>
+              <a:t>Click to edit Master text styles</a:t>
+            </a:r>
+          </a:p>
+          <a:p>
+            <a:pPr lvl="1"/>
+            <a:r>
+              <a:rPr lang="en-US" smtClean="0"/>
+              <a:t>Second level</a:t>
+            </a:r>
+          </a:p>
+          <a:p>
+            <a:pPr lvl="2"/>
+            <a:r>
+              <a:rPr lang="en-US" smtClean="0"/>
+              <a:t>Third level</a:t>
+            </a:r>
+          </a:p>
+          <a:p>
+            <a:pPr lvl="3"/>
+            <a:r>
+              <a:rPr lang="en-US" smtClean="0"/>
+              <a:t>Fourth level</a:t>
+            </a:r>
+          </a:p>
+          <a:p>
+            <a:pPr lvl="4"/>
+            <a:r>
+              <a:rPr lang="en-US" smtClean="0"/>
+              <a:t>Fifth level</a:t>
+            </a:r>
+            <a:endParaRPr lang="en-US"/>
+          </a:p>
+        </p:txBody>
+      </p:sp>
+      <p:sp>
+        <p:nvSpPr>
+          <p:cNvPr id="6" name="Footer Placeholder 5"/>
+          <p:cNvSpPr>
+            <a:spLocks noGrp="1"/>
+          </p:cNvSpPr>
+          <p:nvPr>
+            <p:ph type="ftr" sz="quarter" idx="4"/>
+          </p:nvPr>
+        </p:nvSpPr>
+        <p:spPr>
+          <a:xfrm>
+            <a:off x="0" y="8685213"/>
+            <a:ext cx="2971800" cy="458787"/>
+          </a:xfrm>
+          <a:prstGeom prst="rect">
+            <a:avLst/>
+          </a:prstGeom>
+        </p:spPr>
+        <p:txBody>
+          <a:bodyPr vert="horz" lIns="91440" tIns="45720" rIns="91440" bIns="45720" rtlCol="0" anchor="b"/>
+          <a:lstStyle>
+            <a:lvl1pPr algn="l">
+              <a:defRPr sz="1200"/>
+            </a:lvl1pPr>
+          </a:lstStyle>
+          <a:p>
+            <a:endParaRPr lang="en-US"/>
+          </a:p>
+        </p:txBody>
+      </p:sp>
+      <p:sp>
+        <p:nvSpPr>
+          <p:cNvPr id="7" name="Slide Number Placeholder 6"/>
+          <p:cNvSpPr>
+            <a:spLocks noGrp="1"/>
+          </p:cNvSpPr>
+          <p:nvPr>
+            <p:ph type="sldNum" sz="quarter" idx="5"/>
+          </p:nvPr>
+        </p:nvSpPr>
+        <p:spPr>
+          <a:xfrm>
+            <a:off x="3884613" y="8685213"/>
+            <a:ext cx="2971800" cy="458787"/>
+          </a:xfrm>
+          <a:prstGeom prst="rect">
+            <a:avLst/>
+          </a:prstGeom>
+        </p:spPr>
+        <p:txBody>
+          <a:bodyPr vert="horz" lIns="91440" tIns="45720" rIns="91440" bIns="45720" rtlCol="0" anchor="b"/>
+          <a:lstStyle>
+            <a:lvl1pPr algn="r">
+              <a:defRPr sz="1200"/>
+            </a:lvl1pPr>
+          </a:lstStyle>
+          <a:p>
+            <a:fld id="{9A70C7CC-1470-DA4F-9C15-EC92F5C5F2B6}" type="slidenum">
+              <a:rPr lang="en-US" smtClean="0"/>
+              <a:t>‹#›</a:t>
+            </a:fld>
+            <a:endParaRPr lang="en-US"/>
+          </a:p>
+        </p:txBody>
+      </p:sp>
+    </p:spTree>
+    <p:extLst>
+      <p:ext uri="{BB962C8B-B14F-4D97-AF65-F5344CB8AC3E}">
+        <p14:creationId xmlns:p14="http://schemas.microsoft.com/office/powerpoint/2010/main" val="575177228"/>
+      </p:ext>
+    </p:extLst>
+  </p:cSld>
+  <p:clrMap bg1="lt1" tx1="dk1" bg2="lt2" tx2="dk2" accent1="accent1" accent2="accent2" accent3="accent3" accent4="accent4" accent5="accent5" accent6="accent6" hlink="hlink" folHlink="folHlink"/>
+  <p:notesStyle>
+    <a:lvl1pPr marL="0" algn="l" defTabSz="914400" rtl="0" eaLnBrk="1" latinLnBrk="0" hangingPunct="1">
+      <a:defRPr sz="1200" kern="1200">
+        <a:solidFill>
+          <a:schemeClr val="tx1"/>
+        </a:solidFill>
+        <a:latin typeface="+mn-lt"/>
+        <a:ea typeface="+mn-ea"/>
+        <a:cs typeface="+mn-cs"/>
+      </a:defRPr>
+    </a:lvl1pPr>
+    <a:lvl2pPr marL="457200" algn="l" defTabSz="914400" rtl="0" eaLnBrk="1" latinLnBrk="0" hangingPunct="1">
+      <a:defRPr sz="1200" kern="1200">
+        <a:solidFill>
+          <a:schemeClr val="tx1"/>
+        </a:solidFill>
+        <a:latin typeface="+mn-lt"/>
+        <a:ea typeface="+mn-ea"/>
+        <a:cs typeface="+mn-cs"/>
+      </a:defRPr>
+    </a:lvl2pPr>
+    <a:lvl3pPr marL="914400" algn="l" defTabSz="914400" rtl="0" eaLnBrk="1" latinLnBrk="0" hangingPunct="1">
+      <a:defRPr sz="1200" kern="1200">
+        <a:solidFill>
+          <a:schemeClr val="tx1"/>
+        </a:solidFill>
+        <a:latin typeface="+mn-lt"/>
+        <a:ea typeface="+mn-ea"/>
+        <a:cs typeface="+mn-cs"/>
+      </a:defRPr>
+    </a:lvl3pPr>
+    <a:lvl4pPr marL="1371600" algn="l" defTabSz="914400" rtl="0" eaLnBrk="1" latinLnBrk="0" hangingPunct="1">
+      <a:defRPr sz="1200" kern="1200">
+        <a:solidFill>
+          <a:schemeClr val="tx1"/>
+        </a:solidFill>
+        <a:latin typeface="+mn-lt"/>
+        <a:ea typeface="+mn-ea"/>
+        <a:cs typeface="+mn-cs"/>
+      </a:defRPr>
+    </a:lvl4pPr>
+    <a:lvl5pPr marL="1828800" algn="l" defTabSz="914400" rtl="0" eaLnBrk="1" latinLnBrk="0" hangingPunct="1">
+      <a:defRPr sz="1200" kern="1200">
+        <a:solidFill>
+          <a:schemeClr val="tx1"/>
+        </a:solidFill>
+        <a:latin typeface="+mn-lt"/>
+        <a:ea typeface="+mn-ea"/>
+        <a:cs typeface="+mn-cs"/>
+      </a:defRPr>
+    </a:lvl5pPr>
+    <a:lvl6pPr marL="2286000" algn="l" defTabSz="914400" rtl="0" eaLnBrk="1" latinLnBrk="0" hangingPunct="1">
+      <a:defRPr sz="1200" kern="1200">
+        <a:solidFill>
+          <a:schemeClr val="tx1"/>
+        </a:solidFill>
+        <a:latin typeface="+mn-lt"/>
+        <a:ea typeface="+mn-ea"/>
+        <a:cs typeface="+mn-cs"/>
+      </a:defRPr>
+    </a:lvl6pPr>
+    <a:lvl7pPr marL="2743200" algn="l" defTabSz="914400" rtl="0" eaLnBrk="1" latinLnBrk="0" hangingPunct="1">
+      <a:defRPr sz="1200" kern="1200">
+        <a:solidFill>
+          <a:schemeClr val="tx1"/>
+        </a:solidFill>
+        <a:latin typeface="+mn-lt"/>
+        <a:ea typeface="+mn-ea"/>
+        <a:cs typeface="+mn-cs"/>
+      </a:defRPr>
+    </a:lvl7pPr>
+    <a:lvl8pPr marL="3200400" algn="l" defTabSz="914400" rtl="0" eaLnBrk="1" latinLnBrk="0" hangingPunct="1">
+      <a:defRPr sz="1200" kern="1200">
+        <a:solidFill>
+          <a:schemeClr val="tx1"/>
+        </a:solidFill>
+        <a:latin typeface="+mn-lt"/>
+        <a:ea typeface="+mn-ea"/>
+        <a:cs typeface="+mn-cs"/>
+      </a:defRPr>
+    </a:lvl8pPr>
+    <a:lvl9pPr marL="3657600" algn="l" defTabSz="914400" rtl="0" eaLnBrk="1" latinLnBrk="0" hangingPunct="1">
+      <a:defRPr sz="1200" kern="1200">
+        <a:solidFill>
+          <a:schemeClr val="tx1"/>
+        </a:solidFill>
+        <a:latin typeface="+mn-lt"/>
+        <a:ea typeface="+mn-ea"/>
+        <a:cs typeface="+mn-cs"/>
+      </a:defRPr>
+    </a:lvl9pPr>
+  </p:notesStyle>
+</p:notesMaster>
+</file>
+
+<file path=ppt/notesSlides/notesSlide1.xml><?xml version="1.0" encoding="utf-8"?>
+<p:notes xmlns:a="http://schemas.openxmlformats.org/drawingml/2006/main" xmlns:r="http://schemas.openxmlformats.org/officeDocument/2006/relationships" xmlns:p="http://schemas.openxmlformats.org/presentationml/2006/main">
+  <p:cSld>
+    <p:spTree>
+      <p:nvGrpSpPr>
+        <p:cNvPr id="1" name=""/>
+        <p:cNvGrpSpPr/>
+        <p:nvPr/>
+      </p:nvGrpSpPr>
+      <p:grpSpPr>
+        <a:xfrm>
+          <a:off x="0" y="0"/>
+          <a:ext cx="0" cy="0"/>
+          <a:chOff x="0" y="0"/>
+          <a:chExt cx="0" cy="0"/>
+        </a:xfrm>
+      </p:grpSpPr>
+      <p:sp>
+        <p:nvSpPr>
+          <p:cNvPr id="2" name="Slide Image Placeholder 1"/>
+          <p:cNvSpPr>
+            <a:spLocks noGrp="1" noRot="1" noChangeAspect="1"/>
+          </p:cNvSpPr>
+          <p:nvPr>
+            <p:ph type="sldImg"/>
+          </p:nvPr>
+        </p:nvSpPr>
+        <p:spPr/>
+      </p:sp>
+      <p:sp>
+        <p:nvSpPr>
+          <p:cNvPr id="3" name="Notes Placeholder 2"/>
+          <p:cNvSpPr>
+            <a:spLocks noGrp="1"/>
+          </p:cNvSpPr>
+          <p:nvPr>
+            <p:ph type="body" idx="1"/>
+          </p:nvPr>
+        </p:nvSpPr>
+        <p:spPr/>
+        <p:txBody>
+          <a:bodyPr/>
+          <a:lstStyle/>
+          <a:p>
+            <a:endParaRPr lang="en-US" dirty="0"/>
+          </a:p>
+        </p:txBody>
+      </p:sp>
+      <p:sp>
+        <p:nvSpPr>
+          <p:cNvPr id="4" name="Slide Number Placeholder 3"/>
+          <p:cNvSpPr>
+            <a:spLocks noGrp="1"/>
+          </p:cNvSpPr>
+          <p:nvPr>
+            <p:ph type="sldNum" sz="quarter" idx="10"/>
+          </p:nvPr>
+        </p:nvSpPr>
+        <p:spPr/>
+        <p:txBody>
+          <a:bodyPr/>
+          <a:lstStyle/>
+          <a:p>
+            <a:fld id="{9A70C7CC-1470-DA4F-9C15-EC92F5C5F2B6}" type="slidenum">
+              <a:rPr lang="en-US" smtClean="0"/>
+              <a:t>2</a:t>
+            </a:fld>
+            <a:endParaRPr lang="en-US"/>
+          </a:p>
+        </p:txBody>
+      </p:sp>
+    </p:spTree>
+    <p:extLst>
+      <p:ext uri="{BB962C8B-B14F-4D97-AF65-F5344CB8AC3E}">
+        <p14:creationId xmlns:p14="http://schemas.microsoft.com/office/powerpoint/2010/main" val="1179775849"/>
+      </p:ext>
+    </p:extLst>
+  </p:cSld>
+  <p:clrMapOvr>
+    <a:masterClrMapping/>
+  </p:clrMapOvr>
+</p:notes>
+</file>
+
 <file path=ppt/slideLayouts/slideLayout1.xml><?xml version="1.0" encoding="utf-8"?>
 <p:sldLayout xmlns:a="http://schemas.openxmlformats.org/drawingml/2006/main" xmlns:r="http://schemas.openxmlformats.org/officeDocument/2006/relationships" xmlns:p="http://schemas.openxmlformats.org/presentationml/2006/main" type="title" preserve="1">
   <p:cSld name="Title Slide">
@@ -393,7 +831,7 @@
           <a:p>
             <a:fld id="{78ABE3C1-DBE1-495D-B57B-2849774B866A}" type="datetimeFigureOut">
               <a:rPr lang="en-US" dirty="0"/>
-              <a:t>4/18/16</a:t>
+              <a:t>4/23/16</a:t>
             </a:fld>
             <a:endParaRPr lang="en-US" dirty="0"/>
           </a:p>
@@ -802,7 +1240,7 @@
           <a:p>
             <a:fld id="{446C117F-5CCF-4837-BE5F-2B92066CAFAF}" type="datetimeFigureOut">
               <a:rPr lang="en-US" dirty="0"/>
-              <a:t>4/18/16</a:t>
+              <a:t>4/23/16</a:t>
             </a:fld>
             <a:endParaRPr lang="en-US" dirty="0"/>
           </a:p>
@@ -1133,7 +1571,7 @@
           <a:p>
             <a:fld id="{84EB90BD-B6CE-46B7-997F-7313B992CCDC}" type="datetimeFigureOut">
               <a:rPr lang="en-US" dirty="0"/>
-              <a:t>4/18/16</a:t>
+              <a:t>4/23/16</a:t>
             </a:fld>
             <a:endParaRPr lang="en-US" dirty="0"/>
           </a:p>
@@ -1533,7 +1971,7 @@
           <a:p>
             <a:fld id="{CDB9D11F-B188-461D-B23F-39381795C052}" type="datetimeFigureOut">
               <a:rPr lang="en-US" dirty="0"/>
-              <a:t>4/18/16</a:t>
+              <a:t>4/23/16</a:t>
             </a:fld>
             <a:endParaRPr lang="en-US" dirty="0"/>
           </a:p>
@@ -2096,7 +2534,7 @@
           <a:p>
             <a:fld id="{52E6D8D9-55A2-4063-B0F3-121F44549695}" type="datetimeFigureOut">
               <a:rPr lang="en-US" dirty="0"/>
-              <a:t>4/18/16</a:t>
+              <a:t>4/23/16</a:t>
             </a:fld>
             <a:endParaRPr lang="en-US" dirty="0"/>
           </a:p>
@@ -2772,7 +3210,7 @@
           <a:p>
             <a:fld id="{D4B24536-994D-4021-A283-9F449C0DB509}" type="datetimeFigureOut">
               <a:rPr lang="en-US" dirty="0"/>
-              <a:t>4/18/16</a:t>
+              <a:t>4/23/16</a:t>
             </a:fld>
             <a:endParaRPr lang="en-US" dirty="0"/>
           </a:p>
@@ -3680,7 +4118,7 @@
           <a:p>
             <a:fld id="{3CBBBB78-C96F-47B7-AB17-D852CA960AC9}" type="datetimeFigureOut">
               <a:rPr lang="en-US" dirty="0"/>
-              <a:t>4/18/16</a:t>
+              <a:t>4/23/16</a:t>
             </a:fld>
             <a:endParaRPr lang="en-US" dirty="0"/>
           </a:p>
@@ -3988,7 +4426,7 @@
           <a:p>
             <a:fld id="{1FA3F48C-C7C6-4055-9F49-3777875E72AE}" type="datetimeFigureOut">
               <a:rPr lang="en-US" dirty="0"/>
-              <a:t>4/18/16</a:t>
+              <a:t>4/23/16</a:t>
             </a:fld>
             <a:endParaRPr lang="en-US" dirty="0"/>
           </a:p>
@@ -4247,7 +4685,7 @@
           <a:p>
             <a:fld id="{6178E61D-D431-422C-9764-11DAFE33AB63}" type="datetimeFigureOut">
               <a:rPr lang="en-US" dirty="0"/>
-              <a:t>4/18/16</a:t>
+              <a:t>4/23/16</a:t>
             </a:fld>
             <a:endParaRPr lang="en-US" dirty="0"/>
           </a:p>
@@ -4566,7 +5004,7 @@
           <a:p>
             <a:fld id="{12DE42F4-6EEF-4EF7-8ED4-2208F0F89A08}" type="datetimeFigureOut">
               <a:rPr lang="en-US" dirty="0"/>
-              <a:t>4/18/16</a:t>
+              <a:t>4/23/16</a:t>
             </a:fld>
             <a:endParaRPr lang="en-US" dirty="0"/>
           </a:p>
@@ -4950,7 +5388,7 @@
           <a:p>
             <a:fld id="{30578ACC-22D6-47C1-A373-4FD133E34F3C}" type="datetimeFigureOut">
               <a:rPr lang="en-US" dirty="0"/>
-              <a:t>4/18/16</a:t>
+              <a:t>4/23/16</a:t>
             </a:fld>
             <a:endParaRPr lang="en-US" dirty="0"/>
           </a:p>
@@ -5321,7 +5759,7 @@
           <a:p>
             <a:fld id="{4E5A6C69-6797-4E8A-BF37-F2C3751466E9}" type="datetimeFigureOut">
               <a:rPr lang="en-US" dirty="0"/>
-              <a:t>4/18/16</a:t>
+              <a:t>4/23/16</a:t>
             </a:fld>
             <a:endParaRPr lang="en-US" dirty="0"/>
           </a:p>
@@ -5822,7 +6260,7 @@
           <a:p>
             <a:fld id="{D82014A1-A632-4878-A0D3-F52BA7563730}" type="datetimeFigureOut">
               <a:rPr lang="en-US" dirty="0"/>
-              <a:t>4/18/16</a:t>
+              <a:t>4/23/16</a:t>
             </a:fld>
             <a:endParaRPr lang="en-US" dirty="0"/>
           </a:p>
@@ -6074,7 +6512,7 @@
           <a:p>
             <a:fld id="{CE99F462-093F-4566-844B-4C71F2739DA5}" type="datetimeFigureOut">
               <a:rPr lang="en-US" dirty="0"/>
-              <a:t>4/18/16</a:t>
+              <a:t>4/23/16</a:t>
             </a:fld>
             <a:endParaRPr lang="en-US" dirty="0"/>
           </a:p>
@@ -6232,7 +6670,7 @@
           <a:p>
             <a:fld id="{3D24A7AC-904D-4781-85BA-7D10C17ED021}" type="datetimeFigureOut">
               <a:rPr lang="en-US" dirty="0"/>
-              <a:t>4/18/16</a:t>
+              <a:t>4/23/16</a:t>
             </a:fld>
             <a:endParaRPr lang="en-US" dirty="0"/>
           </a:p>
@@ -6617,7 +7055,7 @@
           <a:p>
             <a:fld id="{E331444B-B92B-4E27-8C94-BB93EAF5CB18}" type="datetimeFigureOut">
               <a:rPr lang="en-US" dirty="0"/>
-              <a:t>4/18/16</a:t>
+              <a:t>4/23/16</a:t>
             </a:fld>
             <a:endParaRPr lang="en-US" dirty="0"/>
           </a:p>
@@ -7021,7 +7459,7 @@
           <a:p>
             <a:fld id="{363EFA5E-FA76-400D-B3DC-F0BA90E6D107}" type="datetimeFigureOut">
               <a:rPr lang="en-US" dirty="0"/>
-              <a:t>4/18/16</a:t>
+              <a:t>4/23/16</a:t>
             </a:fld>
             <a:endParaRPr lang="en-US" dirty="0"/>
           </a:p>
@@ -7260,7 +7698,7 @@
           <a:p>
             <a:fld id="{9D6E9DEC-419B-4CC5-A080-3B06BD5A8291}" type="datetimeFigureOut">
               <a:rPr lang="en-US" dirty="0"/>
-              <a:t>4/18/16</a:t>
+              <a:t>4/23/16</a:t>
             </a:fld>
             <a:endParaRPr lang="en-US" dirty="0"/>
           </a:p>
@@ -7866,19 +8304,19 @@
             </a:pPr>
             <a:r>
               <a:rPr lang="en-US" dirty="0" smtClean="0">
-                <a:hlinkClick r:id="rId2"/>
+                <a:hlinkClick r:id="rId3"/>
               </a:rPr>
               <a:t>https</a:t>
             </a:r>
             <a:r>
               <a:rPr lang="en-US" dirty="0">
-                <a:hlinkClick r:id="rId2"/>
+                <a:hlinkClick r:id="rId3"/>
               </a:rPr>
               <a:t>://</a:t>
             </a:r>
             <a:r>
               <a:rPr lang="en-US" dirty="0" smtClean="0">
-                <a:hlinkClick r:id="rId2"/>
+                <a:hlinkClick r:id="rId3"/>
               </a:rPr>
               <a:t>archive.ics.uci.edu/ml/datasets/Iris</a:t>
             </a:r>
@@ -7901,7 +8339,7 @@
           <p:nvPr/>
         </p:nvPicPr>
         <p:blipFill>
-          <a:blip r:embed="rId3">
+          <a:blip r:embed="rId4">
             <a:extLst>
               <a:ext uri="{28A0092B-C50C-407E-A947-70E740481C1C}">
                 <a14:useLocalDpi xmlns:a14="http://schemas.microsoft.com/office/drawing/2010/main" val="0"/>
@@ -8011,13 +8449,8 @@
           <a:p>
             <a:r>
               <a:rPr lang="en-US" dirty="0" smtClean="0"/>
-              <a:t>Number of Instances</a:t>
-            </a:r>
-            <a:r>
-              <a:rPr lang="en-US" dirty="0" smtClean="0"/>
-              <a:t>: 150</a:t>
-            </a:r>
-            <a:endParaRPr lang="en-US" dirty="0" smtClean="0"/>
+              <a:t>Number of Instances: 150</a:t>
+            </a:r>
           </a:p>
           <a:p>
             <a:r>
@@ -8157,6 +8590,96 @@
           </a:p>
         </p:txBody>
       </p:sp>
+      <p:pic>
+        <p:nvPicPr>
+          <p:cNvPr id="5" name="Picture 4"/>
+          <p:cNvPicPr>
+            <a:picLocks noChangeAspect="1"/>
+          </p:cNvPicPr>
+          <p:nvPr/>
+        </p:nvPicPr>
+        <p:blipFill>
+          <a:blip r:embed="rId2">
+            <a:extLst>
+              <a:ext uri="{28A0092B-C50C-407E-A947-70E740481C1C}">
+                <a14:useLocalDpi xmlns:a14="http://schemas.microsoft.com/office/drawing/2010/main" val="0"/>
+              </a:ext>
+            </a:extLst>
+          </a:blip>
+          <a:stretch>
+            <a:fillRect/>
+          </a:stretch>
+        </p:blipFill>
+        <p:spPr>
+          <a:xfrm>
+            <a:off x="4709886" y="3354614"/>
+            <a:ext cx="2324100" cy="2184400"/>
+          </a:xfrm>
+          <a:prstGeom prst="rect">
+            <a:avLst/>
+          </a:prstGeom>
+        </p:spPr>
+      </p:pic>
+      <p:pic>
+        <p:nvPicPr>
+          <p:cNvPr id="6" name="Picture 5"/>
+          <p:cNvPicPr>
+            <a:picLocks noChangeAspect="1"/>
+          </p:cNvPicPr>
+          <p:nvPr/>
+        </p:nvPicPr>
+        <p:blipFill>
+          <a:blip r:embed="rId3">
+            <a:extLst>
+              <a:ext uri="{28A0092B-C50C-407E-A947-70E740481C1C}">
+                <a14:useLocalDpi xmlns:a14="http://schemas.microsoft.com/office/drawing/2010/main" val="0"/>
+              </a:ext>
+            </a:extLst>
+          </a:blip>
+          <a:stretch>
+            <a:fillRect/>
+          </a:stretch>
+        </p:blipFill>
+        <p:spPr>
+          <a:xfrm>
+            <a:off x="8815614" y="3068864"/>
+            <a:ext cx="2311400" cy="2781300"/>
+          </a:xfrm>
+          <a:prstGeom prst="rect">
+            <a:avLst/>
+          </a:prstGeom>
+        </p:spPr>
+      </p:pic>
+      <p:pic>
+        <p:nvPicPr>
+          <p:cNvPr id="7" name="Picture 6"/>
+          <p:cNvPicPr>
+            <a:picLocks noChangeAspect="1"/>
+          </p:cNvPicPr>
+          <p:nvPr/>
+        </p:nvPicPr>
+        <p:blipFill>
+          <a:blip r:embed="rId4">
+            <a:extLst>
+              <a:ext uri="{28A0092B-C50C-407E-A947-70E740481C1C}">
+                <a14:useLocalDpi xmlns:a14="http://schemas.microsoft.com/office/drawing/2010/main" val="0"/>
+              </a:ext>
+            </a:extLst>
+          </a:blip>
+          <a:stretch>
+            <a:fillRect/>
+          </a:stretch>
+        </p:blipFill>
+        <p:spPr>
+          <a:xfrm>
+            <a:off x="1054100" y="3303814"/>
+            <a:ext cx="2349500" cy="2286000"/>
+          </a:xfrm>
+          <a:prstGeom prst="rect">
+            <a:avLst/>
+          </a:prstGeom>
+        </p:spPr>
+      </p:pic>
     </p:spTree>
     <p:extLst>
       <p:ext uri="{BB962C8B-B14F-4D97-AF65-F5344CB8AC3E}">
@@ -8459,7 +8982,7 @@
           <a:p>
             <a:r>
               <a:rPr lang="en-US" dirty="0" smtClean="0"/>
-              <a:t>Result	</a:t>
+              <a:t>Plotting the data</a:t>
             </a:r>
             <a:endParaRPr lang="en-US" dirty="0"/>
           </a:p>
@@ -8489,45 +9012,15 @@
         </p:blipFill>
         <p:spPr>
           <a:xfrm>
-            <a:off x="680321" y="2153077"/>
-            <a:ext cx="5334000" cy="660400"/>
-          </a:xfrm>
-        </p:spPr>
-      </p:pic>
-      <p:pic>
-        <p:nvPicPr>
-          <p:cNvPr id="5" name="Picture 4"/>
-          <p:cNvPicPr>
-            <a:picLocks noChangeAspect="1"/>
-          </p:cNvPicPr>
-          <p:nvPr/>
-        </p:nvPicPr>
-        <p:blipFill>
-          <a:blip r:embed="rId3">
-            <a:extLst>
-              <a:ext uri="{28A0092B-C50C-407E-A947-70E740481C1C}">
-                <a14:useLocalDpi xmlns:a14="http://schemas.microsoft.com/office/drawing/2010/main" val="0"/>
-              </a:ext>
-            </a:extLst>
-          </a:blip>
-          <a:stretch>
-            <a:fillRect/>
-          </a:stretch>
-        </p:blipFill>
-        <p:spPr>
-          <a:xfrm>
-            <a:off x="680321" y="3132388"/>
-            <a:ext cx="7721600" cy="1308100"/>
-          </a:xfrm>
-          <a:prstGeom prst="rect">
-            <a:avLst/>
-          </a:prstGeom>
+            <a:off x="802126" y="2365828"/>
+            <a:ext cx="3740179" cy="3598863"/>
+          </a:xfrm>
         </p:spPr>
       </p:pic>
     </p:spTree>
     <p:extLst>
       <p:ext uri="{BB962C8B-B14F-4D97-AF65-F5344CB8AC3E}">
-        <p14:creationId xmlns:p14="http://schemas.microsoft.com/office/powerpoint/2010/main" val="1530322741"/>
+        <p14:creationId xmlns:p14="http://schemas.microsoft.com/office/powerpoint/2010/main" val="305196548"/>
       </p:ext>
     </p:extLst>
   </p:cSld>
@@ -8571,7 +9064,7 @@
           <a:p>
             <a:r>
               <a:rPr lang="en-US" dirty="0" smtClean="0"/>
-              <a:t>Conclusion	</a:t>
+              <a:t>Result	</a:t>
             </a:r>
             <a:endParaRPr lang="en-US" dirty="0"/>
           </a:p>
@@ -8579,7 +9072,7 @@
       </p:sp>
       <p:pic>
         <p:nvPicPr>
-          <p:cNvPr id="6" name="Content Placeholder 5"/>
+          <p:cNvPr id="4" name="Content Placeholder 3"/>
           <p:cNvPicPr>
             <a:picLocks noGrp="1" noChangeAspect="1"/>
           </p:cNvPicPr>
@@ -8601,11 +9094,188 @@
         </p:blipFill>
         <p:spPr>
           <a:xfrm>
+            <a:off x="680321" y="2153077"/>
+            <a:ext cx="5334000" cy="660400"/>
+          </a:xfrm>
+        </p:spPr>
+      </p:pic>
+      <p:pic>
+        <p:nvPicPr>
+          <p:cNvPr id="5" name="Picture 4"/>
+          <p:cNvPicPr>
+            <a:picLocks noChangeAspect="1"/>
+          </p:cNvPicPr>
+          <p:nvPr/>
+        </p:nvPicPr>
+        <p:blipFill>
+          <a:blip r:embed="rId3">
+            <a:extLst>
+              <a:ext uri="{28A0092B-C50C-407E-A947-70E740481C1C}">
+                <a14:useLocalDpi xmlns:a14="http://schemas.microsoft.com/office/drawing/2010/main" val="0"/>
+              </a:ext>
+            </a:extLst>
+          </a:blip>
+          <a:stretch>
+            <a:fillRect/>
+          </a:stretch>
+        </p:blipFill>
+        <p:spPr>
+          <a:xfrm>
+            <a:off x="680321" y="3132388"/>
+            <a:ext cx="7721600" cy="1308100"/>
+          </a:xfrm>
+          <a:prstGeom prst="rect">
+            <a:avLst/>
+          </a:prstGeom>
+        </p:spPr>
+      </p:pic>
+      <p:sp>
+        <p:nvSpPr>
+          <p:cNvPr id="3" name="TextBox 2"/>
+          <p:cNvSpPr txBox="1"/>
+          <p:nvPr/>
+        </p:nvSpPr>
+        <p:spPr>
+          <a:xfrm>
+            <a:off x="561135" y="4574732"/>
+            <a:ext cx="11064808" cy="923330"/>
+          </a:xfrm>
+          <a:prstGeom prst="rect">
+            <a:avLst/>
+          </a:prstGeom>
+          <a:noFill/>
+        </p:spPr>
+        <p:txBody>
+          <a:bodyPr wrap="square" rtlCol="0">
+            <a:spAutoFit/>
+          </a:bodyPr>
+          <a:lstStyle/>
+          <a:p>
+            <a:r>
+              <a:rPr lang="en-US" dirty="0" smtClean="0"/>
+              <a:t>I compared the test result from the regression predict function to the actual test target values. Then I put them in an array. True states the actual result and the predicted result match. False indicates otherwise. </a:t>
+            </a:r>
+            <a:endParaRPr lang="en-US" dirty="0"/>
+          </a:p>
+        </p:txBody>
+      </p:sp>
+    </p:spTree>
+    <p:extLst>
+      <p:ext uri="{BB962C8B-B14F-4D97-AF65-F5344CB8AC3E}">
+        <p14:creationId xmlns:p14="http://schemas.microsoft.com/office/powerpoint/2010/main" val="1530322741"/>
+      </p:ext>
+    </p:extLst>
+  </p:cSld>
+  <p:clrMapOvr>
+    <a:masterClrMapping/>
+  </p:clrMapOvr>
+</p:sld>
+</file>
+
+<file path=ppt/slides/slide9.xml><?xml version="1.0" encoding="utf-8"?>
+<p:sld xmlns:a="http://schemas.openxmlformats.org/drawingml/2006/main" xmlns:r="http://schemas.openxmlformats.org/officeDocument/2006/relationships" xmlns:p="http://schemas.openxmlformats.org/presentationml/2006/main">
+  <p:cSld>
+    <p:spTree>
+      <p:nvGrpSpPr>
+        <p:cNvPr id="1" name=""/>
+        <p:cNvGrpSpPr/>
+        <p:nvPr/>
+      </p:nvGrpSpPr>
+      <p:grpSpPr>
+        <a:xfrm>
+          <a:off x="0" y="0"/>
+          <a:ext cx="0" cy="0"/>
+          <a:chOff x="0" y="0"/>
+          <a:chExt cx="0" cy="0"/>
+        </a:xfrm>
+      </p:grpSpPr>
+      <p:sp>
+        <p:nvSpPr>
+          <p:cNvPr id="2" name="Title 1"/>
+          <p:cNvSpPr>
+            <a:spLocks noGrp="1"/>
+          </p:cNvSpPr>
+          <p:nvPr>
+            <p:ph type="title"/>
+          </p:nvPr>
+        </p:nvSpPr>
+        <p:spPr/>
+        <p:txBody>
+          <a:bodyPr/>
+          <a:lstStyle/>
+          <a:p>
+            <a:r>
+              <a:rPr lang="en-US" dirty="0" smtClean="0"/>
+              <a:t>Conclusion	</a:t>
+            </a:r>
+            <a:endParaRPr lang="en-US" dirty="0"/>
+          </a:p>
+        </p:txBody>
+      </p:sp>
+      <p:pic>
+        <p:nvPicPr>
+          <p:cNvPr id="6" name="Content Placeholder 5"/>
+          <p:cNvPicPr>
+            <a:picLocks noGrp="1" noChangeAspect="1"/>
+          </p:cNvPicPr>
+          <p:nvPr>
+            <p:ph idx="1"/>
+          </p:nvPr>
+        </p:nvPicPr>
+        <p:blipFill>
+          <a:blip r:embed="rId2">
+            <a:extLst>
+              <a:ext uri="{28A0092B-C50C-407E-A947-70E740481C1C}">
+                <a14:useLocalDpi xmlns:a14="http://schemas.microsoft.com/office/drawing/2010/main" val="0"/>
+              </a:ext>
+            </a:extLst>
+          </a:blip>
+          <a:stretch>
+            <a:fillRect/>
+          </a:stretch>
+        </p:blipFill>
+        <p:spPr>
+          <a:xfrm>
             <a:off x="680321" y="2085669"/>
             <a:ext cx="2273300" cy="584200"/>
           </a:xfrm>
         </p:spPr>
       </p:pic>
+      <p:sp>
+        <p:nvSpPr>
+          <p:cNvPr id="3" name="TextBox 2"/>
+          <p:cNvSpPr txBox="1"/>
+          <p:nvPr/>
+        </p:nvSpPr>
+        <p:spPr>
+          <a:xfrm>
+            <a:off x="680321" y="3009900"/>
+            <a:ext cx="9092329" cy="1477328"/>
+          </a:xfrm>
+          <a:prstGeom prst="rect">
+            <a:avLst/>
+          </a:prstGeom>
+          <a:noFill/>
+        </p:spPr>
+        <p:txBody>
+          <a:bodyPr wrap="square" rtlCol="0">
+            <a:spAutoFit/>
+          </a:bodyPr>
+          <a:lstStyle/>
+          <a:p>
+            <a:r>
+              <a:rPr lang="en-US" dirty="0" smtClean="0"/>
+              <a:t>There were a total 73 instance of data for testing the fit . It turned out that though the inbuilt fitting algorithm, there was a high match. I got 69 correct prediction while getting only 4 wrong. This turned out to be 94 % correct prediction. </a:t>
+            </a:r>
+          </a:p>
+          <a:p>
+            <a:endParaRPr lang="en-US" dirty="0"/>
+          </a:p>
+          <a:p>
+            <a:endParaRPr lang="en-US" dirty="0"/>
+          </a:p>
+        </p:txBody>
+      </p:sp>
     </p:spTree>
     <p:extLst>
       <p:ext uri="{BB962C8B-B14F-4D97-AF65-F5344CB8AC3E}">
@@ -8871,4 +9541,265 @@
     </a:ext>
   </a:extLst>
 </a:theme>
+</file>
+
+<file path=ppt/theme/theme2.xml><?xml version="1.0" encoding="utf-8"?>
+<a:theme xmlns:a="http://schemas.openxmlformats.org/drawingml/2006/main" name="Office Theme">
+  <a:themeElements>
+    <a:clrScheme name="Office">
+      <a:dk1>
+        <a:sysClr val="windowText" lastClr="000000"/>
+      </a:dk1>
+      <a:lt1>
+        <a:sysClr val="window" lastClr="FFFFFF"/>
+      </a:lt1>
+      <a:dk2>
+        <a:srgbClr val="44546A"/>
+      </a:dk2>
+      <a:lt2>
+        <a:srgbClr val="E7E6E6"/>
+      </a:lt2>
+      <a:accent1>
+        <a:srgbClr val="5B9BD5"/>
+      </a:accent1>
+      <a:accent2>
+        <a:srgbClr val="ED7D31"/>
+      </a:accent2>
+      <a:accent3>
+        <a:srgbClr val="A5A5A5"/>
+      </a:accent3>
+      <a:accent4>
+        <a:srgbClr val="FFC000"/>
+      </a:accent4>
+      <a:accent5>
+        <a:srgbClr val="4472C4"/>
+      </a:accent5>
+      <a:accent6>
+        <a:srgbClr val="70AD47"/>
+      </a:accent6>
+      <a:hlink>
+        <a:srgbClr val="0563C1"/>
+      </a:hlink>
+      <a:folHlink>
+        <a:srgbClr val="954F72"/>
+      </a:folHlink>
+    </a:clrScheme>
+    <a:fontScheme name="Office">
+      <a:majorFont>
+        <a:latin typeface="Calibri Light" panose="020F0302020204030204"/>
+        <a:ea typeface=""/>
+        <a:cs typeface=""/>
+        <a:font script="Jpan" typeface="Yu Gothic Light"/>
+        <a:font script="Hang" typeface="맑은 고딕"/>
+        <a:font script="Hans" typeface="DengXian Light"/>
+        <a:font script="Hant" typeface="新細明體"/>
+        <a:font script="Arab" typeface="Times New Roman"/>
+        <a:font script="Hebr" typeface="Times New Roman"/>
+        <a:font script="Thai" typeface="Angsana New"/>
+        <a:font script="Ethi" typeface="Nyala"/>
+        <a:font script="Beng" typeface="Vrinda"/>
+        <a:font script="Gujr" typeface="Shruti"/>
+        <a:font script="Khmr" typeface="MoolBoran"/>
+        <a:font script="Knda" typeface="Tunga"/>
+        <a:font script="Guru" typeface="Raavi"/>
+        <a:font script="Cans" typeface="Euphemia"/>
+        <a:font script="Cher" typeface="Plantagenet Cherokee"/>
+        <a:font script="Yiii" typeface="Microsoft Yi Baiti"/>
+        <a:font script="Tibt" typeface="Microsoft Himalaya"/>
+        <a:font script="Thaa" typeface="MV Boli"/>
+        <a:font script="Deva" typeface="Mangal"/>
+        <a:font script="Telu" typeface="Gautami"/>
+        <a:font script="Taml" typeface="Latha"/>
+        <a:font script="Syrc" typeface="Estrangelo Edessa"/>
+        <a:font script="Orya" typeface="Kalinga"/>
+        <a:font script="Mlym" typeface="Kartika"/>
+        <a:font script="Laoo" typeface="DokChampa"/>
+        <a:font script="Sinh" typeface="Iskoola Pota"/>
+        <a:font script="Mong" typeface="Mongolian Baiti"/>
+        <a:font script="Viet" typeface="Times New Roman"/>
+        <a:font script="Uigh" typeface="Microsoft Uighur"/>
+        <a:font script="Geor" typeface="Sylfaen"/>
+      </a:majorFont>
+      <a:minorFont>
+        <a:latin typeface="Calibri" panose="020F0502020204030204"/>
+        <a:ea typeface=""/>
+        <a:cs typeface=""/>
+        <a:font script="Jpan" typeface="Yu Gothic"/>
+        <a:font script="Hang" typeface="맑은 고딕"/>
+        <a:font script="Hans" typeface="DengXian"/>
+        <a:font script="Hant" typeface="新細明體"/>
+        <a:font script="Arab" typeface="Arial"/>
+        <a:font script="Hebr" typeface="Arial"/>
+        <a:font script="Thai" typeface="Cordia New"/>
+        <a:font script="Ethi" typeface="Nyala"/>
+        <a:font script="Beng" typeface="Vrinda"/>
+        <a:font script="Gujr" typeface="Shruti"/>
+        <a:font script="Khmr" typeface="DaunPenh"/>
+        <a:font script="Knda" typeface="Tunga"/>
+        <a:font script="Guru" typeface="Raavi"/>
+        <a:font script="Cans" typeface="Euphemia"/>
+        <a:font script="Cher" typeface="Plantagenet Cherokee"/>
+        <a:font script="Yiii" typeface="Microsoft Yi Baiti"/>
+        <a:font script="Tibt" typeface="Microsoft Himalaya"/>
+        <a:font script="Thaa" typeface="MV Boli"/>
+        <a:font script="Deva" typeface="Mangal"/>
+        <a:font script="Telu" typeface="Gautami"/>
+        <a:font script="Taml" typeface="Latha"/>
+        <a:font script="Syrc" typeface="Estrangelo Edessa"/>
+        <a:font script="Orya" typeface="Kalinga"/>
+        <a:font script="Mlym" typeface="Kartika"/>
+        <a:font script="Laoo" typeface="DokChampa"/>
+        <a:font script="Sinh" typeface="Iskoola Pota"/>
+        <a:font script="Mong" typeface="Mongolian Baiti"/>
+        <a:font script="Viet" typeface="Arial"/>
+        <a:font script="Uigh" typeface="Microsoft Uighur"/>
+        <a:font script="Geor" typeface="Sylfaen"/>
+      </a:minorFont>
+    </a:fontScheme>
+    <a:fmtScheme name="Office">
+      <a:fillStyleLst>
+        <a:solidFill>
+          <a:schemeClr val="phClr"/>
+        </a:solidFill>
+        <a:gradFill rotWithShape="1">
+          <a:gsLst>
+            <a:gs pos="0">
+              <a:schemeClr val="phClr">
+                <a:lumMod val="110000"/>
+                <a:satMod val="105000"/>
+                <a:tint val="67000"/>
+              </a:schemeClr>
+            </a:gs>
+            <a:gs pos="50000">
+              <a:schemeClr val="phClr">
+                <a:lumMod val="105000"/>
+                <a:satMod val="103000"/>
+                <a:tint val="73000"/>
+              </a:schemeClr>
+            </a:gs>
+            <a:gs pos="100000">
+              <a:schemeClr val="phClr">
+                <a:lumMod val="105000"/>
+                <a:satMod val="109000"/>
+                <a:tint val="81000"/>
+              </a:schemeClr>
+            </a:gs>
+          </a:gsLst>
+          <a:lin ang="5400000" scaled="0"/>
+        </a:gradFill>
+        <a:gradFill rotWithShape="1">
+          <a:gsLst>
+            <a:gs pos="0">
+              <a:schemeClr val="phClr">
+                <a:satMod val="103000"/>
+                <a:lumMod val="102000"/>
+                <a:tint val="94000"/>
+              </a:schemeClr>
+            </a:gs>
+            <a:gs pos="50000">
+              <a:schemeClr val="phClr">
+                <a:satMod val="110000"/>
+                <a:lumMod val="100000"/>
+                <a:shade val="100000"/>
+              </a:schemeClr>
+            </a:gs>
+            <a:gs pos="100000">
+              <a:schemeClr val="phClr">
+                <a:lumMod val="99000"/>
+                <a:satMod val="120000"/>
+                <a:shade val="78000"/>
+              </a:schemeClr>
+            </a:gs>
+          </a:gsLst>
+          <a:lin ang="5400000" scaled="0"/>
+        </a:gradFill>
+      </a:fillStyleLst>
+      <a:lnStyleLst>
+        <a:ln w="6350" cap="flat" cmpd="sng" algn="ctr">
+          <a:solidFill>
+            <a:schemeClr val="phClr"/>
+          </a:solidFill>
+          <a:prstDash val="solid"/>
+          <a:miter lim="800000"/>
+        </a:ln>
+        <a:ln w="12700" cap="flat" cmpd="sng" algn="ctr">
+          <a:solidFill>
+            <a:schemeClr val="phClr"/>
+          </a:solidFill>
+          <a:prstDash val="solid"/>
+          <a:miter lim="800000"/>
+        </a:ln>
+        <a:ln w="19050" cap="flat" cmpd="sng" algn="ctr">
+          <a:solidFill>
+            <a:schemeClr val="phClr"/>
+          </a:solidFill>
+          <a:prstDash val="solid"/>
+          <a:miter lim="800000"/>
+        </a:ln>
+      </a:lnStyleLst>
+      <a:effectStyleLst>
+        <a:effectStyle>
+          <a:effectLst/>
+        </a:effectStyle>
+        <a:effectStyle>
+          <a:effectLst/>
+        </a:effectStyle>
+        <a:effectStyle>
+          <a:effectLst>
+            <a:outerShdw blurRad="57150" dist="19050" dir="5400000" algn="ctr" rotWithShape="0">
+              <a:srgbClr val="000000">
+                <a:alpha val="63000"/>
+              </a:srgbClr>
+            </a:outerShdw>
+          </a:effectLst>
+        </a:effectStyle>
+      </a:effectStyleLst>
+      <a:bgFillStyleLst>
+        <a:solidFill>
+          <a:schemeClr val="phClr"/>
+        </a:solidFill>
+        <a:solidFill>
+          <a:schemeClr val="phClr">
+            <a:tint val="95000"/>
+            <a:satMod val="170000"/>
+          </a:schemeClr>
+        </a:solidFill>
+        <a:gradFill rotWithShape="1">
+          <a:gsLst>
+            <a:gs pos="0">
+              <a:schemeClr val="phClr">
+                <a:tint val="93000"/>
+                <a:satMod val="150000"/>
+                <a:shade val="98000"/>
+                <a:lumMod val="102000"/>
+              </a:schemeClr>
+            </a:gs>
+            <a:gs pos="50000">
+              <a:schemeClr val="phClr">
+                <a:tint val="98000"/>
+                <a:satMod val="130000"/>
+                <a:shade val="90000"/>
+                <a:lumMod val="103000"/>
+              </a:schemeClr>
+            </a:gs>
+            <a:gs pos="100000">
+              <a:schemeClr val="phClr">
+                <a:shade val="63000"/>
+                <a:satMod val="120000"/>
+              </a:schemeClr>
+            </a:gs>
+          </a:gsLst>
+          <a:lin ang="5400000" scaled="0"/>
+        </a:gradFill>
+      </a:bgFillStyleLst>
+    </a:fmtScheme>
+  </a:themeElements>
+  <a:objectDefaults/>
+  <a:extraClrSchemeLst/>
+  <a:extLst>
+    <a:ext uri="{05A4C25C-085E-4340-85A3-A5531E510DB2}">
+      <thm15:themeFamily xmlns:thm15="http://schemas.microsoft.com/office/thememl/2012/main" name="Office Theme" id="{62F939B6-93AF-4DB8-9C6B-D6C7DFDC589F}" vid="{4A3C46E8-61CC-4603-A589-7422A47A8E4A}"/>
+    </a:ext>
+  </a:extLst>
+</a:theme>
 </file>
</xml_diff>